<commit_message>
Add image of nested dictionaries
</commit_message>
<xml_diff>
--- a/images/powerpoint_slides/powerpoint_graphics.pptx
+++ b/images/powerpoint_slides/powerpoint_graphics.pptx
@@ -6,6 +6,7 @@
   </p:sldMasterIdLst>
   <p:sldIdLst>
     <p:sldId id="256" r:id="rId2"/>
+    <p:sldId id="257" r:id="rId3"/>
   </p:sldIdLst>
   <p:sldSz cx="12192000" cy="6858000"/>
   <p:notesSz cx="6858000" cy="9144000"/>
@@ -104,6 +105,11 @@
       </a:defRPr>
     </a:lvl9pPr>
   </p:defaultTextStyle>
+  <p:extLst>
+    <p:ext uri="{EFAFB233-063F-42B5-8137-9DF3F51BA10A}">
+      <p15:sldGuideLst xmlns:p15="http://schemas.microsoft.com/office/powerpoint/2012/main"/>
+    </p:ext>
+  </p:extLst>
 </p:presentation>
 </file>
 
@@ -254,7 +260,7 @@
           <a:p>
             <a:fld id="{AEE0FC47-AD6B-6B40-8FAB-1A8EEA03FB38}" type="datetimeFigureOut">
               <a:rPr lang="en-GB" smtClean="0"/>
-              <a:t>18/09/2025</a:t>
+              <a:t>13/10/2025</a:t>
             </a:fld>
             <a:endParaRPr lang="en-GB"/>
           </a:p>
@@ -452,7 +458,7 @@
           <a:p>
             <a:fld id="{AEE0FC47-AD6B-6B40-8FAB-1A8EEA03FB38}" type="datetimeFigureOut">
               <a:rPr lang="en-GB" smtClean="0"/>
-              <a:t>18/09/2025</a:t>
+              <a:t>13/10/2025</a:t>
             </a:fld>
             <a:endParaRPr lang="en-GB"/>
           </a:p>
@@ -660,7 +666,7 @@
           <a:p>
             <a:fld id="{AEE0FC47-AD6B-6B40-8FAB-1A8EEA03FB38}" type="datetimeFigureOut">
               <a:rPr lang="en-GB" smtClean="0"/>
-              <a:t>18/09/2025</a:t>
+              <a:t>13/10/2025</a:t>
             </a:fld>
             <a:endParaRPr lang="en-GB"/>
           </a:p>
@@ -858,7 +864,7 @@
           <a:p>
             <a:fld id="{AEE0FC47-AD6B-6B40-8FAB-1A8EEA03FB38}" type="datetimeFigureOut">
               <a:rPr lang="en-GB" smtClean="0"/>
-              <a:t>18/09/2025</a:t>
+              <a:t>13/10/2025</a:t>
             </a:fld>
             <a:endParaRPr lang="en-GB"/>
           </a:p>
@@ -1133,7 +1139,7 @@
           <a:p>
             <a:fld id="{AEE0FC47-AD6B-6B40-8FAB-1A8EEA03FB38}" type="datetimeFigureOut">
               <a:rPr lang="en-GB" smtClean="0"/>
-              <a:t>18/09/2025</a:t>
+              <a:t>13/10/2025</a:t>
             </a:fld>
             <a:endParaRPr lang="en-GB"/>
           </a:p>
@@ -1398,7 +1404,7 @@
           <a:p>
             <a:fld id="{AEE0FC47-AD6B-6B40-8FAB-1A8EEA03FB38}" type="datetimeFigureOut">
               <a:rPr lang="en-GB" smtClean="0"/>
-              <a:t>18/09/2025</a:t>
+              <a:t>13/10/2025</a:t>
             </a:fld>
             <a:endParaRPr lang="en-GB"/>
           </a:p>
@@ -1810,7 +1816,7 @@
           <a:p>
             <a:fld id="{AEE0FC47-AD6B-6B40-8FAB-1A8EEA03FB38}" type="datetimeFigureOut">
               <a:rPr lang="en-GB" smtClean="0"/>
-              <a:t>18/09/2025</a:t>
+              <a:t>13/10/2025</a:t>
             </a:fld>
             <a:endParaRPr lang="en-GB"/>
           </a:p>
@@ -1951,7 +1957,7 @@
           <a:p>
             <a:fld id="{AEE0FC47-AD6B-6B40-8FAB-1A8EEA03FB38}" type="datetimeFigureOut">
               <a:rPr lang="en-GB" smtClean="0"/>
-              <a:t>18/09/2025</a:t>
+              <a:t>13/10/2025</a:t>
             </a:fld>
             <a:endParaRPr lang="en-GB"/>
           </a:p>
@@ -2064,7 +2070,7 @@
           <a:p>
             <a:fld id="{AEE0FC47-AD6B-6B40-8FAB-1A8EEA03FB38}" type="datetimeFigureOut">
               <a:rPr lang="en-GB" smtClean="0"/>
-              <a:t>18/09/2025</a:t>
+              <a:t>13/10/2025</a:t>
             </a:fld>
             <a:endParaRPr lang="en-GB"/>
           </a:p>
@@ -2375,7 +2381,7 @@
           <a:p>
             <a:fld id="{AEE0FC47-AD6B-6B40-8FAB-1A8EEA03FB38}" type="datetimeFigureOut">
               <a:rPr lang="en-GB" smtClean="0"/>
-              <a:t>18/09/2025</a:t>
+              <a:t>13/10/2025</a:t>
             </a:fld>
             <a:endParaRPr lang="en-GB"/>
           </a:p>
@@ -2663,7 +2669,7 @@
           <a:p>
             <a:fld id="{AEE0FC47-AD6B-6B40-8FAB-1A8EEA03FB38}" type="datetimeFigureOut">
               <a:rPr lang="en-GB" smtClean="0"/>
-              <a:t>18/09/2025</a:t>
+              <a:t>13/10/2025</a:t>
             </a:fld>
             <a:endParaRPr lang="en-GB"/>
           </a:p>
@@ -2904,7 +2910,7 @@
           <a:p>
             <a:fld id="{AEE0FC47-AD6B-6B40-8FAB-1A8EEA03FB38}" type="datetimeFigureOut">
               <a:rPr lang="en-GB" smtClean="0"/>
-              <a:t>18/09/2025</a:t>
+              <a:t>13/10/2025</a:t>
             </a:fld>
             <a:endParaRPr lang="en-GB"/>
           </a:p>
@@ -4878,6 +4884,2032 @@
 </p:sld>
 </file>
 
+<file path=ppt/slides/slide2.xml><?xml version="1.0" encoding="utf-8"?>
+<p:sld xmlns:a="http://schemas.openxmlformats.org/drawingml/2006/main" xmlns:r="http://schemas.openxmlformats.org/officeDocument/2006/relationships" xmlns:p="http://schemas.openxmlformats.org/presentationml/2006/main">
+  <p:cSld>
+    <p:bg>
+      <p:bgPr>
+        <a:solidFill>
+          <a:srgbClr val="FDE5F1"/>
+        </a:solidFill>
+        <a:effectLst/>
+      </p:bgPr>
+    </p:bg>
+    <p:spTree>
+      <p:nvGrpSpPr>
+        <p:cNvPr id="1" name=""/>
+        <p:cNvGrpSpPr/>
+        <p:nvPr/>
+      </p:nvGrpSpPr>
+      <p:grpSpPr>
+        <a:xfrm>
+          <a:off x="0" y="0"/>
+          <a:ext cx="0" cy="0"/>
+          <a:chOff x="0" y="0"/>
+          <a:chExt cx="0" cy="0"/>
+        </a:xfrm>
+      </p:grpSpPr>
+      <p:grpSp>
+        <p:nvGrpSpPr>
+          <p:cNvPr id="89" name="Group 88">
+            <a:extLst>
+              <a:ext uri="{FF2B5EF4-FFF2-40B4-BE49-F238E27FC236}">
+                <a16:creationId xmlns:a16="http://schemas.microsoft.com/office/drawing/2014/main" id="{38E331EF-B5B0-0725-35D9-B7406502F755}"/>
+              </a:ext>
+            </a:extLst>
+          </p:cNvPr>
+          <p:cNvGrpSpPr/>
+          <p:nvPr/>
+        </p:nvGrpSpPr>
+        <p:grpSpPr>
+          <a:xfrm>
+            <a:off x="244929" y="477781"/>
+            <a:ext cx="10696014" cy="6151619"/>
+            <a:chOff x="2235197" y="2246087"/>
+            <a:chExt cx="8878280" cy="3760898"/>
+          </a:xfrm>
+        </p:grpSpPr>
+        <p:sp>
+          <p:nvSpPr>
+            <p:cNvPr id="4" name="TextBox 3">
+              <a:extLst>
+                <a:ext uri="{FF2B5EF4-FFF2-40B4-BE49-F238E27FC236}">
+                  <a16:creationId xmlns:a16="http://schemas.microsoft.com/office/drawing/2014/main" id="{49B3A866-94E6-BA42-058F-48BB28C5DF50}"/>
+                </a:ext>
+              </a:extLst>
+            </p:cNvPr>
+            <p:cNvSpPr txBox="1"/>
+            <p:nvPr/>
+          </p:nvSpPr>
+          <p:spPr>
+            <a:xfrm>
+              <a:off x="2235197" y="2246087"/>
+              <a:ext cx="2177143" cy="386714"/>
+            </a:xfrm>
+            <a:prstGeom prst="rect">
+              <a:avLst/>
+            </a:prstGeom>
+            <a:noFill/>
+          </p:spPr>
+          <p:txBody>
+            <a:bodyPr wrap="square" rtlCol="0">
+              <a:spAutoFit/>
+            </a:bodyPr>
+            <a:lstStyle/>
+            <a:p>
+              <a:pPr algn="ctr"/>
+              <a:r>
+                <a:rPr lang="en-GB" sz="3200" b="1" dirty="0">
+                  <a:solidFill>
+                    <a:schemeClr val="accent1"/>
+                  </a:solidFill>
+                </a:rPr>
+                <a:t>Dictionary</a:t>
+              </a:r>
+            </a:p>
+          </p:txBody>
+        </p:sp>
+        <p:sp>
+          <p:nvSpPr>
+            <p:cNvPr id="6" name="Rounded Rectangle 5">
+              <a:extLst>
+                <a:ext uri="{FF2B5EF4-FFF2-40B4-BE49-F238E27FC236}">
+                  <a16:creationId xmlns:a16="http://schemas.microsoft.com/office/drawing/2014/main" id="{4C8DF4CA-E59C-5433-B3BC-DC55C84F15B1}"/>
+                </a:ext>
+              </a:extLst>
+            </p:cNvPr>
+            <p:cNvSpPr/>
+            <p:nvPr/>
+          </p:nvSpPr>
+          <p:spPr>
+            <a:xfrm>
+              <a:off x="2235197" y="2652779"/>
+              <a:ext cx="2177143" cy="2748254"/>
+            </a:xfrm>
+            <a:prstGeom prst="roundRect">
+              <a:avLst/>
+            </a:prstGeom>
+            <a:solidFill>
+              <a:srgbClr val="B6E2FF"/>
+            </a:solidFill>
+            <a:ln>
+              <a:solidFill>
+                <a:srgbClr val="7689A4"/>
+              </a:solidFill>
+            </a:ln>
+          </p:spPr>
+          <p:style>
+            <a:lnRef idx="2">
+              <a:schemeClr val="accent1">
+                <a:shade val="15000"/>
+              </a:schemeClr>
+            </a:lnRef>
+            <a:fillRef idx="1">
+              <a:schemeClr val="accent1"/>
+            </a:fillRef>
+            <a:effectRef idx="0">
+              <a:schemeClr val="accent1"/>
+            </a:effectRef>
+            <a:fontRef idx="minor">
+              <a:schemeClr val="lt1"/>
+            </a:fontRef>
+          </p:style>
+          <p:txBody>
+            <a:bodyPr rtlCol="0" anchor="ctr"/>
+            <a:lstStyle/>
+            <a:p>
+              <a:pPr algn="ctr"/>
+              <a:endParaRPr lang="en-GB" sz="2400"/>
+            </a:p>
+          </p:txBody>
+        </p:sp>
+        <p:sp>
+          <p:nvSpPr>
+            <p:cNvPr id="7" name="Rectangle 6">
+              <a:extLst>
+                <a:ext uri="{FF2B5EF4-FFF2-40B4-BE49-F238E27FC236}">
+                  <a16:creationId xmlns:a16="http://schemas.microsoft.com/office/drawing/2014/main" id="{E6F406E1-2E60-457E-8634-62E56D3D00C0}"/>
+                </a:ext>
+              </a:extLst>
+            </p:cNvPr>
+            <p:cNvSpPr/>
+            <p:nvPr/>
+          </p:nvSpPr>
+          <p:spPr>
+            <a:xfrm>
+              <a:off x="2641600" y="2844800"/>
+              <a:ext cx="1349829" cy="584200"/>
+            </a:xfrm>
+            <a:prstGeom prst="rect">
+              <a:avLst/>
+            </a:prstGeom>
+            <a:solidFill>
+              <a:schemeClr val="bg1"/>
+            </a:solidFill>
+            <a:ln>
+              <a:solidFill>
+                <a:srgbClr val="7689A4"/>
+              </a:solidFill>
+            </a:ln>
+          </p:spPr>
+          <p:style>
+            <a:lnRef idx="2">
+              <a:schemeClr val="accent1">
+                <a:shade val="15000"/>
+              </a:schemeClr>
+            </a:lnRef>
+            <a:fillRef idx="1">
+              <a:schemeClr val="accent1"/>
+            </a:fillRef>
+            <a:effectRef idx="0">
+              <a:schemeClr val="accent1"/>
+            </a:effectRef>
+            <a:fontRef idx="minor">
+              <a:schemeClr val="lt1"/>
+            </a:fontRef>
+          </p:style>
+          <p:txBody>
+            <a:bodyPr rtlCol="0" anchor="ctr"/>
+            <a:lstStyle/>
+            <a:p>
+              <a:pPr algn="ctr"/>
+              <a:r>
+                <a:rPr lang="en-GB" sz="2400" dirty="0">
+                  <a:solidFill>
+                    <a:schemeClr val="accent1"/>
+                  </a:solidFill>
+                </a:rPr>
+                <a:t>Key 1</a:t>
+              </a:r>
+            </a:p>
+          </p:txBody>
+        </p:sp>
+        <p:sp>
+          <p:nvSpPr>
+            <p:cNvPr id="8" name="Rectangle 7">
+              <a:extLst>
+                <a:ext uri="{FF2B5EF4-FFF2-40B4-BE49-F238E27FC236}">
+                  <a16:creationId xmlns:a16="http://schemas.microsoft.com/office/drawing/2014/main" id="{20C0C02D-3A63-34C3-95A0-8D986963001D}"/>
+                </a:ext>
+              </a:extLst>
+            </p:cNvPr>
+            <p:cNvSpPr/>
+            <p:nvPr/>
+          </p:nvSpPr>
+          <p:spPr>
+            <a:xfrm>
+              <a:off x="2648853" y="3735614"/>
+              <a:ext cx="1349829" cy="584200"/>
+            </a:xfrm>
+            <a:prstGeom prst="rect">
+              <a:avLst/>
+            </a:prstGeom>
+            <a:solidFill>
+              <a:schemeClr val="bg1"/>
+            </a:solidFill>
+            <a:ln>
+              <a:solidFill>
+                <a:srgbClr val="7689A4"/>
+              </a:solidFill>
+            </a:ln>
+          </p:spPr>
+          <p:style>
+            <a:lnRef idx="2">
+              <a:schemeClr val="accent1">
+                <a:shade val="15000"/>
+              </a:schemeClr>
+            </a:lnRef>
+            <a:fillRef idx="1">
+              <a:schemeClr val="accent1"/>
+            </a:fillRef>
+            <a:effectRef idx="0">
+              <a:schemeClr val="accent1"/>
+            </a:effectRef>
+            <a:fontRef idx="minor">
+              <a:schemeClr val="lt1"/>
+            </a:fontRef>
+          </p:style>
+          <p:txBody>
+            <a:bodyPr rtlCol="0" anchor="ctr"/>
+            <a:lstStyle/>
+            <a:p>
+              <a:pPr algn="ctr"/>
+              <a:r>
+                <a:rPr lang="en-GB" sz="2400" dirty="0">
+                  <a:solidFill>
+                    <a:schemeClr val="accent1"/>
+                  </a:solidFill>
+                </a:rPr>
+                <a:t>Key 2</a:t>
+              </a:r>
+            </a:p>
+          </p:txBody>
+        </p:sp>
+        <p:sp>
+          <p:nvSpPr>
+            <p:cNvPr id="9" name="Rectangle 8">
+              <a:extLst>
+                <a:ext uri="{FF2B5EF4-FFF2-40B4-BE49-F238E27FC236}">
+                  <a16:creationId xmlns:a16="http://schemas.microsoft.com/office/drawing/2014/main" id="{ADD06598-46D8-F468-092E-E9D8BAF364C8}"/>
+                </a:ext>
+              </a:extLst>
+            </p:cNvPr>
+            <p:cNvSpPr/>
+            <p:nvPr/>
+          </p:nvSpPr>
+          <p:spPr>
+            <a:xfrm>
+              <a:off x="2641599" y="4626428"/>
+              <a:ext cx="1349829" cy="584200"/>
+            </a:xfrm>
+            <a:prstGeom prst="rect">
+              <a:avLst/>
+            </a:prstGeom>
+            <a:solidFill>
+              <a:schemeClr val="bg1"/>
+            </a:solidFill>
+            <a:ln>
+              <a:solidFill>
+                <a:srgbClr val="7689A4"/>
+              </a:solidFill>
+            </a:ln>
+          </p:spPr>
+          <p:style>
+            <a:lnRef idx="2">
+              <a:schemeClr val="accent1">
+                <a:shade val="15000"/>
+              </a:schemeClr>
+            </a:lnRef>
+            <a:fillRef idx="1">
+              <a:schemeClr val="accent1"/>
+            </a:fillRef>
+            <a:effectRef idx="0">
+              <a:schemeClr val="accent1"/>
+            </a:effectRef>
+            <a:fontRef idx="minor">
+              <a:schemeClr val="lt1"/>
+            </a:fontRef>
+          </p:style>
+          <p:txBody>
+            <a:bodyPr rtlCol="0" anchor="ctr"/>
+            <a:lstStyle/>
+            <a:p>
+              <a:pPr algn="ctr"/>
+              <a:r>
+                <a:rPr lang="en-GB" sz="2400" dirty="0">
+                  <a:solidFill>
+                    <a:schemeClr val="accent1"/>
+                  </a:solidFill>
+                </a:rPr>
+                <a:t>Key 3</a:t>
+              </a:r>
+            </a:p>
+          </p:txBody>
+        </p:sp>
+        <p:sp>
+          <p:nvSpPr>
+            <p:cNvPr id="10" name="Oval 9">
+              <a:extLst>
+                <a:ext uri="{FF2B5EF4-FFF2-40B4-BE49-F238E27FC236}">
+                  <a16:creationId xmlns:a16="http://schemas.microsoft.com/office/drawing/2014/main" id="{D5B29042-36EC-3CFA-492D-793ABCD30096}"/>
+                </a:ext>
+              </a:extLst>
+            </p:cNvPr>
+            <p:cNvSpPr/>
+            <p:nvPr/>
+          </p:nvSpPr>
+          <p:spPr>
+            <a:xfrm>
+              <a:off x="3935122" y="3076091"/>
+              <a:ext cx="112611" cy="121619"/>
+            </a:xfrm>
+            <a:prstGeom prst="ellipse">
+              <a:avLst/>
+            </a:prstGeom>
+            <a:solidFill>
+              <a:schemeClr val="bg1"/>
+            </a:solidFill>
+            <a:ln>
+              <a:solidFill>
+                <a:srgbClr val="7689A4"/>
+              </a:solidFill>
+            </a:ln>
+          </p:spPr>
+          <p:style>
+            <a:lnRef idx="2">
+              <a:schemeClr val="accent1">
+                <a:shade val="15000"/>
+              </a:schemeClr>
+            </a:lnRef>
+            <a:fillRef idx="1">
+              <a:schemeClr val="accent1"/>
+            </a:fillRef>
+            <a:effectRef idx="0">
+              <a:schemeClr val="accent1"/>
+            </a:effectRef>
+            <a:fontRef idx="minor">
+              <a:schemeClr val="lt1"/>
+            </a:fontRef>
+          </p:style>
+          <p:txBody>
+            <a:bodyPr rtlCol="0" anchor="ctr"/>
+            <a:lstStyle/>
+            <a:p>
+              <a:pPr algn="ctr"/>
+              <a:endParaRPr lang="en-GB" sz="2400"/>
+            </a:p>
+          </p:txBody>
+        </p:sp>
+        <p:sp>
+          <p:nvSpPr>
+            <p:cNvPr id="11" name="Oval 10">
+              <a:extLst>
+                <a:ext uri="{FF2B5EF4-FFF2-40B4-BE49-F238E27FC236}">
+                  <a16:creationId xmlns:a16="http://schemas.microsoft.com/office/drawing/2014/main" id="{95A5A252-3418-DA8D-DBEC-A51C00EC1220}"/>
+                </a:ext>
+              </a:extLst>
+            </p:cNvPr>
+            <p:cNvSpPr/>
+            <p:nvPr/>
+          </p:nvSpPr>
+          <p:spPr>
+            <a:xfrm>
+              <a:off x="3942376" y="3966904"/>
+              <a:ext cx="112611" cy="121619"/>
+            </a:xfrm>
+            <a:prstGeom prst="ellipse">
+              <a:avLst/>
+            </a:prstGeom>
+            <a:solidFill>
+              <a:schemeClr val="bg1"/>
+            </a:solidFill>
+            <a:ln>
+              <a:solidFill>
+                <a:srgbClr val="7689A4"/>
+              </a:solidFill>
+            </a:ln>
+          </p:spPr>
+          <p:style>
+            <a:lnRef idx="2">
+              <a:schemeClr val="accent1">
+                <a:shade val="15000"/>
+              </a:schemeClr>
+            </a:lnRef>
+            <a:fillRef idx="1">
+              <a:schemeClr val="accent1"/>
+            </a:fillRef>
+            <a:effectRef idx="0">
+              <a:schemeClr val="accent1"/>
+            </a:effectRef>
+            <a:fontRef idx="minor">
+              <a:schemeClr val="lt1"/>
+            </a:fontRef>
+          </p:style>
+          <p:txBody>
+            <a:bodyPr rtlCol="0" anchor="ctr"/>
+            <a:lstStyle/>
+            <a:p>
+              <a:pPr algn="ctr"/>
+              <a:endParaRPr lang="en-GB" sz="2400"/>
+            </a:p>
+          </p:txBody>
+        </p:sp>
+        <p:sp>
+          <p:nvSpPr>
+            <p:cNvPr id="12" name="Oval 11">
+              <a:extLst>
+                <a:ext uri="{FF2B5EF4-FFF2-40B4-BE49-F238E27FC236}">
+                  <a16:creationId xmlns:a16="http://schemas.microsoft.com/office/drawing/2014/main" id="{7C457F9A-09FB-2CCB-C30E-15807BAF9991}"/>
+                </a:ext>
+              </a:extLst>
+            </p:cNvPr>
+            <p:cNvSpPr/>
+            <p:nvPr/>
+          </p:nvSpPr>
+          <p:spPr>
+            <a:xfrm>
+              <a:off x="3942375" y="4857718"/>
+              <a:ext cx="112611" cy="121619"/>
+            </a:xfrm>
+            <a:prstGeom prst="ellipse">
+              <a:avLst/>
+            </a:prstGeom>
+            <a:solidFill>
+              <a:schemeClr val="bg1"/>
+            </a:solidFill>
+            <a:ln>
+              <a:solidFill>
+                <a:srgbClr val="7689A4"/>
+              </a:solidFill>
+            </a:ln>
+          </p:spPr>
+          <p:style>
+            <a:lnRef idx="2">
+              <a:schemeClr val="accent1">
+                <a:shade val="15000"/>
+              </a:schemeClr>
+            </a:lnRef>
+            <a:fillRef idx="1">
+              <a:schemeClr val="accent1"/>
+            </a:fillRef>
+            <a:effectRef idx="0">
+              <a:schemeClr val="accent1"/>
+            </a:effectRef>
+            <a:fontRef idx="minor">
+              <a:schemeClr val="lt1"/>
+            </a:fontRef>
+          </p:style>
+          <p:txBody>
+            <a:bodyPr rtlCol="0" anchor="ctr"/>
+            <a:lstStyle/>
+            <a:p>
+              <a:pPr algn="ctr"/>
+              <a:endParaRPr lang="en-GB" sz="2400"/>
+            </a:p>
+          </p:txBody>
+        </p:sp>
+        <p:cxnSp>
+          <p:nvCxnSpPr>
+            <p:cNvPr id="14" name="Straight Connector 13">
+              <a:extLst>
+                <a:ext uri="{FF2B5EF4-FFF2-40B4-BE49-F238E27FC236}">
+                  <a16:creationId xmlns:a16="http://schemas.microsoft.com/office/drawing/2014/main" id="{23EB90C5-613F-373A-3E44-BC12A952F209}"/>
+                </a:ext>
+              </a:extLst>
+            </p:cNvPr>
+            <p:cNvCxnSpPr/>
+            <p:nvPr/>
+          </p:nvCxnSpPr>
+          <p:spPr>
+            <a:xfrm>
+              <a:off x="4054986" y="3136900"/>
+              <a:ext cx="1660014" cy="0"/>
+            </a:xfrm>
+            <a:prstGeom prst="line">
+              <a:avLst/>
+            </a:prstGeom>
+            <a:ln>
+              <a:solidFill>
+                <a:srgbClr val="7689A4"/>
+              </a:solidFill>
+            </a:ln>
+          </p:spPr>
+          <p:style>
+            <a:lnRef idx="2">
+              <a:schemeClr val="accent1"/>
+            </a:lnRef>
+            <a:fillRef idx="0">
+              <a:schemeClr val="accent1"/>
+            </a:fillRef>
+            <a:effectRef idx="1">
+              <a:schemeClr val="accent1"/>
+            </a:effectRef>
+            <a:fontRef idx="minor">
+              <a:schemeClr val="tx1"/>
+            </a:fontRef>
+          </p:style>
+        </p:cxnSp>
+        <p:cxnSp>
+          <p:nvCxnSpPr>
+            <p:cNvPr id="15" name="Straight Connector 14">
+              <a:extLst>
+                <a:ext uri="{FF2B5EF4-FFF2-40B4-BE49-F238E27FC236}">
+                  <a16:creationId xmlns:a16="http://schemas.microsoft.com/office/drawing/2014/main" id="{FEBAF911-DD3E-DBC3-FA12-7C9B7E5D9679}"/>
+                </a:ext>
+              </a:extLst>
+            </p:cNvPr>
+            <p:cNvCxnSpPr/>
+            <p:nvPr/>
+          </p:nvCxnSpPr>
+          <p:spPr>
+            <a:xfrm>
+              <a:off x="4054986" y="4027713"/>
+              <a:ext cx="1660014" cy="0"/>
+            </a:xfrm>
+            <a:prstGeom prst="line">
+              <a:avLst/>
+            </a:prstGeom>
+            <a:ln>
+              <a:solidFill>
+                <a:srgbClr val="7689A4"/>
+              </a:solidFill>
+            </a:ln>
+          </p:spPr>
+          <p:style>
+            <a:lnRef idx="2">
+              <a:schemeClr val="accent1"/>
+            </a:lnRef>
+            <a:fillRef idx="0">
+              <a:schemeClr val="accent1"/>
+            </a:fillRef>
+            <a:effectRef idx="1">
+              <a:schemeClr val="accent1"/>
+            </a:effectRef>
+            <a:fontRef idx="minor">
+              <a:schemeClr val="tx1"/>
+            </a:fontRef>
+          </p:style>
+        </p:cxnSp>
+        <p:cxnSp>
+          <p:nvCxnSpPr>
+            <p:cNvPr id="16" name="Straight Connector 15">
+              <a:extLst>
+                <a:ext uri="{FF2B5EF4-FFF2-40B4-BE49-F238E27FC236}">
+                  <a16:creationId xmlns:a16="http://schemas.microsoft.com/office/drawing/2014/main" id="{F5288E2D-B12B-EBBF-5CC1-4067B3552181}"/>
+                </a:ext>
+              </a:extLst>
+            </p:cNvPr>
+            <p:cNvCxnSpPr/>
+            <p:nvPr/>
+          </p:nvCxnSpPr>
+          <p:spPr>
+            <a:xfrm>
+              <a:off x="4054986" y="4918527"/>
+              <a:ext cx="1660014" cy="0"/>
+            </a:xfrm>
+            <a:prstGeom prst="line">
+              <a:avLst/>
+            </a:prstGeom>
+            <a:ln>
+              <a:solidFill>
+                <a:srgbClr val="7689A4"/>
+              </a:solidFill>
+            </a:ln>
+          </p:spPr>
+          <p:style>
+            <a:lnRef idx="2">
+              <a:schemeClr val="accent1"/>
+            </a:lnRef>
+            <a:fillRef idx="0">
+              <a:schemeClr val="accent1"/>
+            </a:fillRef>
+            <a:effectRef idx="1">
+              <a:schemeClr val="accent1"/>
+            </a:effectRef>
+            <a:fontRef idx="minor">
+              <a:schemeClr val="tx1"/>
+            </a:fontRef>
+          </p:style>
+        </p:cxnSp>
+        <p:sp>
+          <p:nvSpPr>
+            <p:cNvPr id="23" name="Rectangle 22">
+              <a:extLst>
+                <a:ext uri="{FF2B5EF4-FFF2-40B4-BE49-F238E27FC236}">
+                  <a16:creationId xmlns:a16="http://schemas.microsoft.com/office/drawing/2014/main" id="{21BE0309-8D81-0984-502E-E4CD438D8458}"/>
+                </a:ext>
+              </a:extLst>
+            </p:cNvPr>
+            <p:cNvSpPr/>
+            <p:nvPr/>
+          </p:nvSpPr>
+          <p:spPr>
+            <a:xfrm>
+              <a:off x="5749537" y="2844800"/>
+              <a:ext cx="2438498" cy="584200"/>
+            </a:xfrm>
+            <a:prstGeom prst="rect">
+              <a:avLst/>
+            </a:prstGeom>
+            <a:solidFill>
+              <a:schemeClr val="bg1"/>
+            </a:solidFill>
+            <a:ln>
+              <a:solidFill>
+                <a:srgbClr val="7689A4"/>
+              </a:solidFill>
+            </a:ln>
+          </p:spPr>
+          <p:style>
+            <a:lnRef idx="2">
+              <a:schemeClr val="accent1">
+                <a:shade val="15000"/>
+              </a:schemeClr>
+            </a:lnRef>
+            <a:fillRef idx="1">
+              <a:schemeClr val="accent1"/>
+            </a:fillRef>
+            <a:effectRef idx="0">
+              <a:schemeClr val="accent1"/>
+            </a:effectRef>
+            <a:fontRef idx="minor">
+              <a:schemeClr val="lt1"/>
+            </a:fontRef>
+          </p:style>
+          <p:txBody>
+            <a:bodyPr rtlCol="0" anchor="ctr"/>
+            <a:lstStyle/>
+            <a:p>
+              <a:pPr algn="ctr"/>
+              <a:r>
+                <a:rPr lang="en-GB" sz="2400" dirty="0">
+                  <a:solidFill>
+                    <a:schemeClr val="accent1"/>
+                  </a:solidFill>
+                </a:rPr>
+                <a:t>Integer or string value</a:t>
+              </a:r>
+            </a:p>
+          </p:txBody>
+        </p:sp>
+        <p:sp>
+          <p:nvSpPr>
+            <p:cNvPr id="20" name="Oval 19">
+              <a:extLst>
+                <a:ext uri="{FF2B5EF4-FFF2-40B4-BE49-F238E27FC236}">
+                  <a16:creationId xmlns:a16="http://schemas.microsoft.com/office/drawing/2014/main" id="{4836899D-F819-BFB6-5361-16F77507508C}"/>
+                </a:ext>
+              </a:extLst>
+            </p:cNvPr>
+            <p:cNvSpPr/>
+            <p:nvPr/>
+          </p:nvSpPr>
+          <p:spPr>
+            <a:xfrm>
+              <a:off x="5685093" y="3081351"/>
+              <a:ext cx="112611" cy="121619"/>
+            </a:xfrm>
+            <a:prstGeom prst="ellipse">
+              <a:avLst/>
+            </a:prstGeom>
+            <a:solidFill>
+              <a:schemeClr val="bg1"/>
+            </a:solidFill>
+            <a:ln>
+              <a:solidFill>
+                <a:srgbClr val="7689A4"/>
+              </a:solidFill>
+            </a:ln>
+          </p:spPr>
+          <p:style>
+            <a:lnRef idx="2">
+              <a:schemeClr val="accent1">
+                <a:shade val="15000"/>
+              </a:schemeClr>
+            </a:lnRef>
+            <a:fillRef idx="1">
+              <a:schemeClr val="accent1"/>
+            </a:fillRef>
+            <a:effectRef idx="0">
+              <a:schemeClr val="accent1"/>
+            </a:effectRef>
+            <a:fontRef idx="minor">
+              <a:schemeClr val="lt1"/>
+            </a:fontRef>
+          </p:style>
+          <p:txBody>
+            <a:bodyPr rtlCol="0" anchor="ctr"/>
+            <a:lstStyle/>
+            <a:p>
+              <a:pPr algn="ctr"/>
+              <a:endParaRPr lang="en-GB" sz="2400"/>
+            </a:p>
+          </p:txBody>
+        </p:sp>
+        <p:sp>
+          <p:nvSpPr>
+            <p:cNvPr id="25" name="Rounded Rectangle 24">
+              <a:extLst>
+                <a:ext uri="{FF2B5EF4-FFF2-40B4-BE49-F238E27FC236}">
+                  <a16:creationId xmlns:a16="http://schemas.microsoft.com/office/drawing/2014/main" id="{8DB00BC9-E6CB-3878-DC4D-9B8972347DAB}"/>
+                </a:ext>
+              </a:extLst>
+            </p:cNvPr>
+            <p:cNvSpPr/>
+            <p:nvPr/>
+          </p:nvSpPr>
+          <p:spPr>
+            <a:xfrm>
+              <a:off x="5762505" y="3737462"/>
+              <a:ext cx="4527389" cy="582352"/>
+            </a:xfrm>
+            <a:prstGeom prst="roundRect">
+              <a:avLst/>
+            </a:prstGeom>
+            <a:solidFill>
+              <a:srgbClr val="FFF2CE"/>
+            </a:solidFill>
+            <a:ln>
+              <a:solidFill>
+                <a:srgbClr val="FFC000"/>
+              </a:solidFill>
+            </a:ln>
+          </p:spPr>
+          <p:style>
+            <a:lnRef idx="2">
+              <a:schemeClr val="accent1">
+                <a:shade val="15000"/>
+              </a:schemeClr>
+            </a:lnRef>
+            <a:fillRef idx="1">
+              <a:schemeClr val="accent1"/>
+            </a:fillRef>
+            <a:effectRef idx="0">
+              <a:schemeClr val="accent1"/>
+            </a:effectRef>
+            <a:fontRef idx="minor">
+              <a:schemeClr val="lt1"/>
+            </a:fontRef>
+          </p:style>
+          <p:txBody>
+            <a:bodyPr rtlCol="0" anchor="ctr"/>
+            <a:lstStyle/>
+            <a:p>
+              <a:pPr algn="ctr"/>
+              <a:endParaRPr lang="en-GB" sz="2400"/>
+            </a:p>
+          </p:txBody>
+        </p:sp>
+        <p:sp>
+          <p:nvSpPr>
+            <p:cNvPr id="62" name="Rectangle 61">
+              <a:extLst>
+                <a:ext uri="{FF2B5EF4-FFF2-40B4-BE49-F238E27FC236}">
+                  <a16:creationId xmlns:a16="http://schemas.microsoft.com/office/drawing/2014/main" id="{B7B60680-56B2-7C06-9CCB-90357C9D5A10}"/>
+                </a:ext>
+              </a:extLst>
+            </p:cNvPr>
+            <p:cNvSpPr/>
+            <p:nvPr/>
+          </p:nvSpPr>
+          <p:spPr>
+            <a:xfrm>
+              <a:off x="5904147" y="3830907"/>
+              <a:ext cx="965793" cy="393612"/>
+            </a:xfrm>
+            <a:prstGeom prst="rect">
+              <a:avLst/>
+            </a:prstGeom>
+            <a:solidFill>
+              <a:schemeClr val="bg1"/>
+            </a:solidFill>
+            <a:ln>
+              <a:solidFill>
+                <a:srgbClr val="7689A4"/>
+              </a:solidFill>
+            </a:ln>
+          </p:spPr>
+          <p:style>
+            <a:lnRef idx="2">
+              <a:schemeClr val="accent1">
+                <a:shade val="15000"/>
+              </a:schemeClr>
+            </a:lnRef>
+            <a:fillRef idx="1">
+              <a:schemeClr val="accent1"/>
+            </a:fillRef>
+            <a:effectRef idx="0">
+              <a:schemeClr val="accent1"/>
+            </a:effectRef>
+            <a:fontRef idx="minor">
+              <a:schemeClr val="lt1"/>
+            </a:fontRef>
+          </p:style>
+          <p:txBody>
+            <a:bodyPr rtlCol="0" anchor="ctr"/>
+            <a:lstStyle/>
+            <a:p>
+              <a:pPr algn="ctr"/>
+              <a:r>
+                <a:rPr lang="en-GB" sz="2400" dirty="0">
+                  <a:solidFill>
+                    <a:schemeClr val="accent1"/>
+                  </a:solidFill>
+                </a:rPr>
+                <a:t>Index 0</a:t>
+              </a:r>
+            </a:p>
+          </p:txBody>
+        </p:sp>
+        <p:sp>
+          <p:nvSpPr>
+            <p:cNvPr id="63" name="Rectangle 62">
+              <a:extLst>
+                <a:ext uri="{FF2B5EF4-FFF2-40B4-BE49-F238E27FC236}">
+                  <a16:creationId xmlns:a16="http://schemas.microsoft.com/office/drawing/2014/main" id="{C1E16A90-6A2A-5F49-86EC-7085569EA3C5}"/>
+                </a:ext>
+              </a:extLst>
+            </p:cNvPr>
+            <p:cNvSpPr/>
+            <p:nvPr/>
+          </p:nvSpPr>
+          <p:spPr>
+            <a:xfrm>
+              <a:off x="7006160" y="3830907"/>
+              <a:ext cx="965793" cy="393612"/>
+            </a:xfrm>
+            <a:prstGeom prst="rect">
+              <a:avLst/>
+            </a:prstGeom>
+            <a:solidFill>
+              <a:schemeClr val="bg1"/>
+            </a:solidFill>
+            <a:ln>
+              <a:solidFill>
+                <a:srgbClr val="7689A4"/>
+              </a:solidFill>
+            </a:ln>
+          </p:spPr>
+          <p:style>
+            <a:lnRef idx="2">
+              <a:schemeClr val="accent1">
+                <a:shade val="15000"/>
+              </a:schemeClr>
+            </a:lnRef>
+            <a:fillRef idx="1">
+              <a:schemeClr val="accent1"/>
+            </a:fillRef>
+            <a:effectRef idx="0">
+              <a:schemeClr val="accent1"/>
+            </a:effectRef>
+            <a:fontRef idx="minor">
+              <a:schemeClr val="lt1"/>
+            </a:fontRef>
+          </p:style>
+          <p:txBody>
+            <a:bodyPr rtlCol="0" anchor="ctr"/>
+            <a:lstStyle/>
+            <a:p>
+              <a:pPr algn="ctr"/>
+              <a:r>
+                <a:rPr lang="en-GB" sz="2400" dirty="0">
+                  <a:solidFill>
+                    <a:schemeClr val="accent1"/>
+                  </a:solidFill>
+                </a:rPr>
+                <a:t>Index 1</a:t>
+              </a:r>
+            </a:p>
+          </p:txBody>
+        </p:sp>
+        <p:sp>
+          <p:nvSpPr>
+            <p:cNvPr id="64" name="Rectangle 63">
+              <a:extLst>
+                <a:ext uri="{FF2B5EF4-FFF2-40B4-BE49-F238E27FC236}">
+                  <a16:creationId xmlns:a16="http://schemas.microsoft.com/office/drawing/2014/main" id="{4CD542C1-4C61-7C04-5621-872548268AC4}"/>
+                </a:ext>
+              </a:extLst>
+            </p:cNvPr>
+            <p:cNvSpPr/>
+            <p:nvPr/>
+          </p:nvSpPr>
+          <p:spPr>
+            <a:xfrm>
+              <a:off x="8108173" y="3830907"/>
+              <a:ext cx="965793" cy="393612"/>
+            </a:xfrm>
+            <a:prstGeom prst="rect">
+              <a:avLst/>
+            </a:prstGeom>
+            <a:solidFill>
+              <a:schemeClr val="bg1"/>
+            </a:solidFill>
+            <a:ln>
+              <a:solidFill>
+                <a:srgbClr val="7689A4"/>
+              </a:solidFill>
+            </a:ln>
+          </p:spPr>
+          <p:style>
+            <a:lnRef idx="2">
+              <a:schemeClr val="accent1">
+                <a:shade val="15000"/>
+              </a:schemeClr>
+            </a:lnRef>
+            <a:fillRef idx="1">
+              <a:schemeClr val="accent1"/>
+            </a:fillRef>
+            <a:effectRef idx="0">
+              <a:schemeClr val="accent1"/>
+            </a:effectRef>
+            <a:fontRef idx="minor">
+              <a:schemeClr val="lt1"/>
+            </a:fontRef>
+          </p:style>
+          <p:txBody>
+            <a:bodyPr rtlCol="0" anchor="ctr"/>
+            <a:lstStyle/>
+            <a:p>
+              <a:pPr algn="ctr"/>
+              <a:r>
+                <a:rPr lang="en-GB" sz="2400" dirty="0">
+                  <a:solidFill>
+                    <a:schemeClr val="accent1"/>
+                  </a:solidFill>
+                </a:rPr>
+                <a:t>Index 2</a:t>
+              </a:r>
+            </a:p>
+          </p:txBody>
+        </p:sp>
+        <p:sp>
+          <p:nvSpPr>
+            <p:cNvPr id="65" name="Rectangle 64">
+              <a:extLst>
+                <a:ext uri="{FF2B5EF4-FFF2-40B4-BE49-F238E27FC236}">
+                  <a16:creationId xmlns:a16="http://schemas.microsoft.com/office/drawing/2014/main" id="{563B55BE-F542-8F74-B7C0-6785BD761791}"/>
+                </a:ext>
+              </a:extLst>
+            </p:cNvPr>
+            <p:cNvSpPr/>
+            <p:nvPr/>
+          </p:nvSpPr>
+          <p:spPr>
+            <a:xfrm>
+              <a:off x="9212986" y="3830907"/>
+              <a:ext cx="965793" cy="393612"/>
+            </a:xfrm>
+            <a:prstGeom prst="rect">
+              <a:avLst/>
+            </a:prstGeom>
+            <a:solidFill>
+              <a:schemeClr val="bg1"/>
+            </a:solidFill>
+            <a:ln>
+              <a:solidFill>
+                <a:srgbClr val="7689A4"/>
+              </a:solidFill>
+            </a:ln>
+          </p:spPr>
+          <p:style>
+            <a:lnRef idx="2">
+              <a:schemeClr val="accent1">
+                <a:shade val="15000"/>
+              </a:schemeClr>
+            </a:lnRef>
+            <a:fillRef idx="1">
+              <a:schemeClr val="accent1"/>
+            </a:fillRef>
+            <a:effectRef idx="0">
+              <a:schemeClr val="accent1"/>
+            </a:effectRef>
+            <a:fontRef idx="minor">
+              <a:schemeClr val="lt1"/>
+            </a:fontRef>
+          </p:style>
+          <p:txBody>
+            <a:bodyPr rtlCol="0" anchor="ctr"/>
+            <a:lstStyle/>
+            <a:p>
+              <a:pPr algn="ctr"/>
+              <a:r>
+                <a:rPr lang="en-GB" sz="2400" dirty="0">
+                  <a:solidFill>
+                    <a:schemeClr val="accent1"/>
+                  </a:solidFill>
+                </a:rPr>
+                <a:t>Index 3</a:t>
+              </a:r>
+            </a:p>
+          </p:txBody>
+        </p:sp>
+        <p:sp>
+          <p:nvSpPr>
+            <p:cNvPr id="21" name="Oval 20">
+              <a:extLst>
+                <a:ext uri="{FF2B5EF4-FFF2-40B4-BE49-F238E27FC236}">
+                  <a16:creationId xmlns:a16="http://schemas.microsoft.com/office/drawing/2014/main" id="{8D226F14-8437-021B-DB23-5C27A22A372C}"/>
+                </a:ext>
+              </a:extLst>
+            </p:cNvPr>
+            <p:cNvSpPr/>
+            <p:nvPr/>
+          </p:nvSpPr>
+          <p:spPr>
+            <a:xfrm>
+              <a:off x="5692347" y="3972164"/>
+              <a:ext cx="112611" cy="121619"/>
+            </a:xfrm>
+            <a:prstGeom prst="ellipse">
+              <a:avLst/>
+            </a:prstGeom>
+            <a:solidFill>
+              <a:schemeClr val="bg1"/>
+            </a:solidFill>
+            <a:ln>
+              <a:solidFill>
+                <a:srgbClr val="7689A4"/>
+              </a:solidFill>
+            </a:ln>
+          </p:spPr>
+          <p:style>
+            <a:lnRef idx="2">
+              <a:schemeClr val="accent1">
+                <a:shade val="15000"/>
+              </a:schemeClr>
+            </a:lnRef>
+            <a:fillRef idx="1">
+              <a:schemeClr val="accent1"/>
+            </a:fillRef>
+            <a:effectRef idx="0">
+              <a:schemeClr val="accent1"/>
+            </a:effectRef>
+            <a:fontRef idx="minor">
+              <a:schemeClr val="lt1"/>
+            </a:fontRef>
+          </p:style>
+          <p:txBody>
+            <a:bodyPr rtlCol="0" anchor="ctr"/>
+            <a:lstStyle/>
+            <a:p>
+              <a:pPr algn="ctr"/>
+              <a:endParaRPr lang="en-GB" sz="2400"/>
+            </a:p>
+          </p:txBody>
+        </p:sp>
+        <p:sp>
+          <p:nvSpPr>
+            <p:cNvPr id="66" name="Rounded Rectangle 65">
+              <a:extLst>
+                <a:ext uri="{FF2B5EF4-FFF2-40B4-BE49-F238E27FC236}">
+                  <a16:creationId xmlns:a16="http://schemas.microsoft.com/office/drawing/2014/main" id="{580B3008-DAD1-1EB5-743E-2839735BFFF9}"/>
+                </a:ext>
+              </a:extLst>
+            </p:cNvPr>
+            <p:cNvSpPr/>
+            <p:nvPr/>
+          </p:nvSpPr>
+          <p:spPr>
+            <a:xfrm>
+              <a:off x="5744892" y="4459221"/>
+              <a:ext cx="1430038" cy="1547764"/>
+            </a:xfrm>
+            <a:prstGeom prst="roundRect">
+              <a:avLst/>
+            </a:prstGeom>
+            <a:solidFill>
+              <a:srgbClr val="B6E2FF"/>
+            </a:solidFill>
+            <a:ln>
+              <a:solidFill>
+                <a:srgbClr val="7689A4"/>
+              </a:solidFill>
+            </a:ln>
+          </p:spPr>
+          <p:style>
+            <a:lnRef idx="2">
+              <a:schemeClr val="accent1">
+                <a:shade val="15000"/>
+              </a:schemeClr>
+            </a:lnRef>
+            <a:fillRef idx="1">
+              <a:schemeClr val="accent1"/>
+            </a:fillRef>
+            <a:effectRef idx="0">
+              <a:schemeClr val="accent1"/>
+            </a:effectRef>
+            <a:fontRef idx="minor">
+              <a:schemeClr val="lt1"/>
+            </a:fontRef>
+          </p:style>
+          <p:txBody>
+            <a:bodyPr rtlCol="0" anchor="ctr"/>
+            <a:lstStyle/>
+            <a:p>
+              <a:pPr algn="ctr"/>
+              <a:endParaRPr lang="en-GB" sz="2400"/>
+            </a:p>
+          </p:txBody>
+        </p:sp>
+        <p:sp>
+          <p:nvSpPr>
+            <p:cNvPr id="67" name="Rectangle 66">
+              <a:extLst>
+                <a:ext uri="{FF2B5EF4-FFF2-40B4-BE49-F238E27FC236}">
+                  <a16:creationId xmlns:a16="http://schemas.microsoft.com/office/drawing/2014/main" id="{B01B4066-520F-18D7-C2D0-A54210939675}"/>
+                </a:ext>
+              </a:extLst>
+            </p:cNvPr>
+            <p:cNvSpPr/>
+            <p:nvPr/>
+          </p:nvSpPr>
+          <p:spPr>
+            <a:xfrm>
+              <a:off x="6050265" y="4721091"/>
+              <a:ext cx="886624" cy="395526"/>
+            </a:xfrm>
+            <a:prstGeom prst="rect">
+              <a:avLst/>
+            </a:prstGeom>
+            <a:solidFill>
+              <a:schemeClr val="bg1"/>
+            </a:solidFill>
+            <a:ln>
+              <a:solidFill>
+                <a:srgbClr val="7689A4"/>
+              </a:solidFill>
+            </a:ln>
+          </p:spPr>
+          <p:style>
+            <a:lnRef idx="2">
+              <a:schemeClr val="accent1">
+                <a:shade val="15000"/>
+              </a:schemeClr>
+            </a:lnRef>
+            <a:fillRef idx="1">
+              <a:schemeClr val="accent1"/>
+            </a:fillRef>
+            <a:effectRef idx="0">
+              <a:schemeClr val="accent1"/>
+            </a:effectRef>
+            <a:fontRef idx="minor">
+              <a:schemeClr val="lt1"/>
+            </a:fontRef>
+          </p:style>
+          <p:txBody>
+            <a:bodyPr rtlCol="0" anchor="ctr"/>
+            <a:lstStyle/>
+            <a:p>
+              <a:pPr algn="ctr"/>
+              <a:r>
+                <a:rPr lang="en-GB" sz="2400" dirty="0">
+                  <a:solidFill>
+                    <a:schemeClr val="accent1"/>
+                  </a:solidFill>
+                </a:rPr>
+                <a:t>Key 1</a:t>
+              </a:r>
+            </a:p>
+          </p:txBody>
+        </p:sp>
+        <p:sp>
+          <p:nvSpPr>
+            <p:cNvPr id="68" name="Rectangle 67">
+              <a:extLst>
+                <a:ext uri="{FF2B5EF4-FFF2-40B4-BE49-F238E27FC236}">
+                  <a16:creationId xmlns:a16="http://schemas.microsoft.com/office/drawing/2014/main" id="{EFF9F094-0B05-2707-5B79-6CC47D12F0C0}"/>
+                </a:ext>
+              </a:extLst>
+            </p:cNvPr>
+            <p:cNvSpPr/>
+            <p:nvPr/>
+          </p:nvSpPr>
+          <p:spPr>
+            <a:xfrm>
+              <a:off x="6050265" y="5380392"/>
+              <a:ext cx="886624" cy="395526"/>
+            </a:xfrm>
+            <a:prstGeom prst="rect">
+              <a:avLst/>
+            </a:prstGeom>
+            <a:solidFill>
+              <a:schemeClr val="bg1"/>
+            </a:solidFill>
+            <a:ln>
+              <a:solidFill>
+                <a:srgbClr val="7689A4"/>
+              </a:solidFill>
+            </a:ln>
+          </p:spPr>
+          <p:style>
+            <a:lnRef idx="2">
+              <a:schemeClr val="accent1">
+                <a:shade val="15000"/>
+              </a:schemeClr>
+            </a:lnRef>
+            <a:fillRef idx="1">
+              <a:schemeClr val="accent1"/>
+            </a:fillRef>
+            <a:effectRef idx="0">
+              <a:schemeClr val="accent1"/>
+            </a:effectRef>
+            <a:fontRef idx="minor">
+              <a:schemeClr val="lt1"/>
+            </a:fontRef>
+          </p:style>
+          <p:txBody>
+            <a:bodyPr rtlCol="0" anchor="ctr"/>
+            <a:lstStyle/>
+            <a:p>
+              <a:pPr algn="ctr"/>
+              <a:r>
+                <a:rPr lang="en-GB" sz="2400" dirty="0">
+                  <a:solidFill>
+                    <a:schemeClr val="accent1"/>
+                  </a:solidFill>
+                </a:rPr>
+                <a:t>Key 2</a:t>
+              </a:r>
+            </a:p>
+          </p:txBody>
+        </p:sp>
+        <p:sp>
+          <p:nvSpPr>
+            <p:cNvPr id="22" name="Oval 21">
+              <a:extLst>
+                <a:ext uri="{FF2B5EF4-FFF2-40B4-BE49-F238E27FC236}">
+                  <a16:creationId xmlns:a16="http://schemas.microsoft.com/office/drawing/2014/main" id="{70885DF3-32DF-E727-C822-E830A7AB0795}"/>
+                </a:ext>
+              </a:extLst>
+            </p:cNvPr>
+            <p:cNvSpPr/>
+            <p:nvPr/>
+          </p:nvSpPr>
+          <p:spPr>
+            <a:xfrm>
+              <a:off x="5692346" y="4862978"/>
+              <a:ext cx="112611" cy="121619"/>
+            </a:xfrm>
+            <a:prstGeom prst="ellipse">
+              <a:avLst/>
+            </a:prstGeom>
+            <a:solidFill>
+              <a:schemeClr val="bg1"/>
+            </a:solidFill>
+            <a:ln>
+              <a:solidFill>
+                <a:srgbClr val="7689A4"/>
+              </a:solidFill>
+            </a:ln>
+          </p:spPr>
+          <p:style>
+            <a:lnRef idx="2">
+              <a:schemeClr val="accent1">
+                <a:shade val="15000"/>
+              </a:schemeClr>
+            </a:lnRef>
+            <a:fillRef idx="1">
+              <a:schemeClr val="accent1"/>
+            </a:fillRef>
+            <a:effectRef idx="0">
+              <a:schemeClr val="accent1"/>
+            </a:effectRef>
+            <a:fontRef idx="minor">
+              <a:schemeClr val="lt1"/>
+            </a:fontRef>
+          </p:style>
+          <p:txBody>
+            <a:bodyPr rtlCol="0" anchor="ctr"/>
+            <a:lstStyle/>
+            <a:p>
+              <a:pPr algn="ctr"/>
+              <a:endParaRPr lang="en-GB" sz="2400"/>
+            </a:p>
+          </p:txBody>
+        </p:sp>
+        <p:sp>
+          <p:nvSpPr>
+            <p:cNvPr id="73" name="Oval 72">
+              <a:extLst>
+                <a:ext uri="{FF2B5EF4-FFF2-40B4-BE49-F238E27FC236}">
+                  <a16:creationId xmlns:a16="http://schemas.microsoft.com/office/drawing/2014/main" id="{FC4A89E8-3CA1-1A2B-D675-CBFAD18276EF}"/>
+                </a:ext>
+              </a:extLst>
+            </p:cNvPr>
+            <p:cNvSpPr/>
+            <p:nvPr/>
+          </p:nvSpPr>
+          <p:spPr>
+            <a:xfrm>
+              <a:off x="6893549" y="4855002"/>
+              <a:ext cx="112611" cy="121619"/>
+            </a:xfrm>
+            <a:prstGeom prst="ellipse">
+              <a:avLst/>
+            </a:prstGeom>
+            <a:solidFill>
+              <a:schemeClr val="bg1"/>
+            </a:solidFill>
+            <a:ln>
+              <a:solidFill>
+                <a:srgbClr val="7689A4"/>
+              </a:solidFill>
+            </a:ln>
+          </p:spPr>
+          <p:style>
+            <a:lnRef idx="2">
+              <a:schemeClr val="accent1">
+                <a:shade val="15000"/>
+              </a:schemeClr>
+            </a:lnRef>
+            <a:fillRef idx="1">
+              <a:schemeClr val="accent1"/>
+            </a:fillRef>
+            <a:effectRef idx="0">
+              <a:schemeClr val="accent1"/>
+            </a:effectRef>
+            <a:fontRef idx="minor">
+              <a:schemeClr val="lt1"/>
+            </a:fontRef>
+          </p:style>
+          <p:txBody>
+            <a:bodyPr rtlCol="0" anchor="ctr"/>
+            <a:lstStyle/>
+            <a:p>
+              <a:pPr algn="ctr"/>
+              <a:endParaRPr lang="en-GB" sz="2400"/>
+            </a:p>
+          </p:txBody>
+        </p:sp>
+        <p:cxnSp>
+          <p:nvCxnSpPr>
+            <p:cNvPr id="74" name="Straight Connector 73">
+              <a:extLst>
+                <a:ext uri="{FF2B5EF4-FFF2-40B4-BE49-F238E27FC236}">
+                  <a16:creationId xmlns:a16="http://schemas.microsoft.com/office/drawing/2014/main" id="{38EC671C-A8BF-EC91-7999-E6EBA2908EBB}"/>
+                </a:ext>
+              </a:extLst>
+            </p:cNvPr>
+            <p:cNvCxnSpPr/>
+            <p:nvPr/>
+          </p:nvCxnSpPr>
+          <p:spPr>
+            <a:xfrm>
+              <a:off x="7006160" y="4915811"/>
+              <a:ext cx="1660014" cy="0"/>
+            </a:xfrm>
+            <a:prstGeom prst="line">
+              <a:avLst/>
+            </a:prstGeom>
+            <a:ln>
+              <a:solidFill>
+                <a:srgbClr val="7689A4"/>
+              </a:solidFill>
+            </a:ln>
+          </p:spPr>
+          <p:style>
+            <a:lnRef idx="2">
+              <a:schemeClr val="accent1"/>
+            </a:lnRef>
+            <a:fillRef idx="0">
+              <a:schemeClr val="accent1"/>
+            </a:fillRef>
+            <a:effectRef idx="1">
+              <a:schemeClr val="accent1"/>
+            </a:effectRef>
+            <a:fontRef idx="minor">
+              <a:schemeClr val="tx1"/>
+            </a:fontRef>
+          </p:style>
+        </p:cxnSp>
+        <p:sp>
+          <p:nvSpPr>
+            <p:cNvPr id="76" name="Oval 75">
+              <a:extLst>
+                <a:ext uri="{FF2B5EF4-FFF2-40B4-BE49-F238E27FC236}">
+                  <a16:creationId xmlns:a16="http://schemas.microsoft.com/office/drawing/2014/main" id="{1864D71B-E32C-AFE9-1758-3544EF831C5D}"/>
+                </a:ext>
+              </a:extLst>
+            </p:cNvPr>
+            <p:cNvSpPr/>
+            <p:nvPr/>
+          </p:nvSpPr>
+          <p:spPr>
+            <a:xfrm>
+              <a:off x="6893549" y="5537955"/>
+              <a:ext cx="112611" cy="121619"/>
+            </a:xfrm>
+            <a:prstGeom prst="ellipse">
+              <a:avLst/>
+            </a:prstGeom>
+            <a:solidFill>
+              <a:schemeClr val="bg1"/>
+            </a:solidFill>
+            <a:ln>
+              <a:solidFill>
+                <a:srgbClr val="7689A4"/>
+              </a:solidFill>
+            </a:ln>
+          </p:spPr>
+          <p:style>
+            <a:lnRef idx="2">
+              <a:schemeClr val="accent1">
+                <a:shade val="15000"/>
+              </a:schemeClr>
+            </a:lnRef>
+            <a:fillRef idx="1">
+              <a:schemeClr val="accent1"/>
+            </a:fillRef>
+            <a:effectRef idx="0">
+              <a:schemeClr val="accent1"/>
+            </a:effectRef>
+            <a:fontRef idx="minor">
+              <a:schemeClr val="lt1"/>
+            </a:fontRef>
+          </p:style>
+          <p:txBody>
+            <a:bodyPr rtlCol="0" anchor="ctr"/>
+            <a:lstStyle/>
+            <a:p>
+              <a:pPr algn="ctr"/>
+              <a:endParaRPr lang="en-GB" sz="2400"/>
+            </a:p>
+          </p:txBody>
+        </p:sp>
+        <p:cxnSp>
+          <p:nvCxnSpPr>
+            <p:cNvPr id="77" name="Straight Connector 76">
+              <a:extLst>
+                <a:ext uri="{FF2B5EF4-FFF2-40B4-BE49-F238E27FC236}">
+                  <a16:creationId xmlns:a16="http://schemas.microsoft.com/office/drawing/2014/main" id="{58D3DB21-93C2-E415-3F4D-6F3DC3F63D42}"/>
+                </a:ext>
+              </a:extLst>
+            </p:cNvPr>
+            <p:cNvCxnSpPr/>
+            <p:nvPr/>
+          </p:nvCxnSpPr>
+          <p:spPr>
+            <a:xfrm>
+              <a:off x="7006160" y="5598764"/>
+              <a:ext cx="1660014" cy="0"/>
+            </a:xfrm>
+            <a:prstGeom prst="line">
+              <a:avLst/>
+            </a:prstGeom>
+            <a:ln>
+              <a:solidFill>
+                <a:srgbClr val="7689A4"/>
+              </a:solidFill>
+            </a:ln>
+          </p:spPr>
+          <p:style>
+            <a:lnRef idx="2">
+              <a:schemeClr val="accent1"/>
+            </a:lnRef>
+            <a:fillRef idx="0">
+              <a:schemeClr val="accent1"/>
+            </a:fillRef>
+            <a:effectRef idx="1">
+              <a:schemeClr val="accent1"/>
+            </a:effectRef>
+            <a:fontRef idx="minor">
+              <a:schemeClr val="tx1"/>
+            </a:fontRef>
+          </p:style>
+        </p:cxnSp>
+        <p:sp>
+          <p:nvSpPr>
+            <p:cNvPr id="78" name="Oval 77">
+              <a:extLst>
+                <a:ext uri="{FF2B5EF4-FFF2-40B4-BE49-F238E27FC236}">
+                  <a16:creationId xmlns:a16="http://schemas.microsoft.com/office/drawing/2014/main" id="{1B2599B2-8D4B-D4C2-F812-D13EF894D299}"/>
+                </a:ext>
+              </a:extLst>
+            </p:cNvPr>
+            <p:cNvSpPr/>
+            <p:nvPr/>
+          </p:nvSpPr>
+          <p:spPr>
+            <a:xfrm>
+              <a:off x="8643520" y="5543215"/>
+              <a:ext cx="112611" cy="121619"/>
+            </a:xfrm>
+            <a:prstGeom prst="ellipse">
+              <a:avLst/>
+            </a:prstGeom>
+            <a:solidFill>
+              <a:schemeClr val="bg1"/>
+            </a:solidFill>
+            <a:ln>
+              <a:solidFill>
+                <a:srgbClr val="7689A4"/>
+              </a:solidFill>
+            </a:ln>
+          </p:spPr>
+          <p:style>
+            <a:lnRef idx="2">
+              <a:schemeClr val="accent1">
+                <a:shade val="15000"/>
+              </a:schemeClr>
+            </a:lnRef>
+            <a:fillRef idx="1">
+              <a:schemeClr val="accent1"/>
+            </a:fillRef>
+            <a:effectRef idx="0">
+              <a:schemeClr val="accent1"/>
+            </a:effectRef>
+            <a:fontRef idx="minor">
+              <a:schemeClr val="lt1"/>
+            </a:fontRef>
+          </p:style>
+          <p:txBody>
+            <a:bodyPr rtlCol="0" anchor="ctr"/>
+            <a:lstStyle/>
+            <a:p>
+              <a:pPr algn="ctr"/>
+              <a:endParaRPr lang="en-GB" sz="2400"/>
+            </a:p>
+          </p:txBody>
+        </p:sp>
+        <p:sp>
+          <p:nvSpPr>
+            <p:cNvPr id="79" name="Rectangle 78">
+              <a:extLst>
+                <a:ext uri="{FF2B5EF4-FFF2-40B4-BE49-F238E27FC236}">
+                  <a16:creationId xmlns:a16="http://schemas.microsoft.com/office/drawing/2014/main" id="{21412291-408B-35E3-6AF9-10EABEDCED64}"/>
+                </a:ext>
+              </a:extLst>
+            </p:cNvPr>
+            <p:cNvSpPr/>
+            <p:nvPr/>
+          </p:nvSpPr>
+          <p:spPr>
+            <a:xfrm>
+              <a:off x="8699825" y="4740827"/>
+              <a:ext cx="2118230" cy="341655"/>
+            </a:xfrm>
+            <a:prstGeom prst="rect">
+              <a:avLst/>
+            </a:prstGeom>
+            <a:solidFill>
+              <a:schemeClr val="bg1"/>
+            </a:solidFill>
+            <a:ln>
+              <a:solidFill>
+                <a:srgbClr val="7689A4"/>
+              </a:solidFill>
+            </a:ln>
+          </p:spPr>
+          <p:style>
+            <a:lnRef idx="2">
+              <a:schemeClr val="accent1">
+                <a:shade val="15000"/>
+              </a:schemeClr>
+            </a:lnRef>
+            <a:fillRef idx="1">
+              <a:schemeClr val="accent1"/>
+            </a:fillRef>
+            <a:effectRef idx="0">
+              <a:schemeClr val="accent1"/>
+            </a:effectRef>
+            <a:fontRef idx="minor">
+              <a:schemeClr val="lt1"/>
+            </a:fontRef>
+          </p:style>
+          <p:txBody>
+            <a:bodyPr rtlCol="0" anchor="ctr"/>
+            <a:lstStyle/>
+            <a:p>
+              <a:pPr algn="ctr"/>
+              <a:r>
+                <a:rPr lang="en-GB" dirty="0">
+                  <a:solidFill>
+                    <a:schemeClr val="accent1"/>
+                  </a:solidFill>
+                </a:rPr>
+                <a:t>Integer or string value</a:t>
+              </a:r>
+            </a:p>
+          </p:txBody>
+        </p:sp>
+        <p:sp>
+          <p:nvSpPr>
+            <p:cNvPr id="80" name="Rounded Rectangle 79">
+              <a:extLst>
+                <a:ext uri="{FF2B5EF4-FFF2-40B4-BE49-F238E27FC236}">
+                  <a16:creationId xmlns:a16="http://schemas.microsoft.com/office/drawing/2014/main" id="{6B0B5C82-A33B-2C3F-6CD6-63211F225D46}"/>
+                </a:ext>
+              </a:extLst>
+            </p:cNvPr>
+            <p:cNvSpPr/>
+            <p:nvPr/>
+          </p:nvSpPr>
+          <p:spPr>
+            <a:xfrm>
+              <a:off x="8713678" y="5307588"/>
+              <a:ext cx="2399799" cy="582352"/>
+            </a:xfrm>
+            <a:prstGeom prst="roundRect">
+              <a:avLst/>
+            </a:prstGeom>
+            <a:solidFill>
+              <a:srgbClr val="FFF2CE"/>
+            </a:solidFill>
+            <a:ln>
+              <a:solidFill>
+                <a:srgbClr val="FFC000"/>
+              </a:solidFill>
+            </a:ln>
+          </p:spPr>
+          <p:style>
+            <a:lnRef idx="2">
+              <a:schemeClr val="accent1">
+                <a:shade val="15000"/>
+              </a:schemeClr>
+            </a:lnRef>
+            <a:fillRef idx="1">
+              <a:schemeClr val="accent1"/>
+            </a:fillRef>
+            <a:effectRef idx="0">
+              <a:schemeClr val="accent1"/>
+            </a:effectRef>
+            <a:fontRef idx="minor">
+              <a:schemeClr val="lt1"/>
+            </a:fontRef>
+          </p:style>
+          <p:txBody>
+            <a:bodyPr rtlCol="0" anchor="ctr"/>
+            <a:lstStyle/>
+            <a:p>
+              <a:pPr algn="ctr"/>
+              <a:endParaRPr lang="en-GB" sz="2400"/>
+            </a:p>
+          </p:txBody>
+        </p:sp>
+        <p:sp>
+          <p:nvSpPr>
+            <p:cNvPr id="81" name="Rectangle 80">
+              <a:extLst>
+                <a:ext uri="{FF2B5EF4-FFF2-40B4-BE49-F238E27FC236}">
+                  <a16:creationId xmlns:a16="http://schemas.microsoft.com/office/drawing/2014/main" id="{06090099-A792-2355-84A3-65A0B2A4EAB4}"/>
+                </a:ext>
+              </a:extLst>
+            </p:cNvPr>
+            <p:cNvSpPr/>
+            <p:nvPr/>
+          </p:nvSpPr>
+          <p:spPr>
+            <a:xfrm>
+              <a:off x="8855320" y="5401033"/>
+              <a:ext cx="965793" cy="393612"/>
+            </a:xfrm>
+            <a:prstGeom prst="rect">
+              <a:avLst/>
+            </a:prstGeom>
+            <a:solidFill>
+              <a:schemeClr val="bg1"/>
+            </a:solidFill>
+            <a:ln>
+              <a:solidFill>
+                <a:srgbClr val="7689A4"/>
+              </a:solidFill>
+            </a:ln>
+          </p:spPr>
+          <p:style>
+            <a:lnRef idx="2">
+              <a:schemeClr val="accent1">
+                <a:shade val="15000"/>
+              </a:schemeClr>
+            </a:lnRef>
+            <a:fillRef idx="1">
+              <a:schemeClr val="accent1"/>
+            </a:fillRef>
+            <a:effectRef idx="0">
+              <a:schemeClr val="accent1"/>
+            </a:effectRef>
+            <a:fontRef idx="minor">
+              <a:schemeClr val="lt1"/>
+            </a:fontRef>
+          </p:style>
+          <p:txBody>
+            <a:bodyPr rtlCol="0" anchor="ctr"/>
+            <a:lstStyle/>
+            <a:p>
+              <a:pPr algn="ctr"/>
+              <a:r>
+                <a:rPr lang="en-GB" sz="2400" dirty="0">
+                  <a:solidFill>
+                    <a:schemeClr val="accent1"/>
+                  </a:solidFill>
+                </a:rPr>
+                <a:t>Index 0</a:t>
+              </a:r>
+            </a:p>
+          </p:txBody>
+        </p:sp>
+        <p:sp>
+          <p:nvSpPr>
+            <p:cNvPr id="82" name="Rectangle 81">
+              <a:extLst>
+                <a:ext uri="{FF2B5EF4-FFF2-40B4-BE49-F238E27FC236}">
+                  <a16:creationId xmlns:a16="http://schemas.microsoft.com/office/drawing/2014/main" id="{6BEB9732-B6D3-5108-F46B-00213B7D7D84}"/>
+                </a:ext>
+              </a:extLst>
+            </p:cNvPr>
+            <p:cNvSpPr/>
+            <p:nvPr/>
+          </p:nvSpPr>
+          <p:spPr>
+            <a:xfrm>
+              <a:off x="9957333" y="5401033"/>
+              <a:ext cx="965793" cy="393612"/>
+            </a:xfrm>
+            <a:prstGeom prst="rect">
+              <a:avLst/>
+            </a:prstGeom>
+            <a:solidFill>
+              <a:schemeClr val="bg1"/>
+            </a:solidFill>
+            <a:ln>
+              <a:solidFill>
+                <a:srgbClr val="7689A4"/>
+              </a:solidFill>
+            </a:ln>
+          </p:spPr>
+          <p:style>
+            <a:lnRef idx="2">
+              <a:schemeClr val="accent1">
+                <a:shade val="15000"/>
+              </a:schemeClr>
+            </a:lnRef>
+            <a:fillRef idx="1">
+              <a:schemeClr val="accent1"/>
+            </a:fillRef>
+            <a:effectRef idx="0">
+              <a:schemeClr val="accent1"/>
+            </a:effectRef>
+            <a:fontRef idx="minor">
+              <a:schemeClr val="lt1"/>
+            </a:fontRef>
+          </p:style>
+          <p:txBody>
+            <a:bodyPr rtlCol="0" anchor="ctr"/>
+            <a:lstStyle/>
+            <a:p>
+              <a:pPr algn="ctr"/>
+              <a:r>
+                <a:rPr lang="en-GB" sz="2400" dirty="0">
+                  <a:solidFill>
+                    <a:schemeClr val="accent1"/>
+                  </a:solidFill>
+                </a:rPr>
+                <a:t>Index 1</a:t>
+              </a:r>
+            </a:p>
+          </p:txBody>
+        </p:sp>
+        <p:sp>
+          <p:nvSpPr>
+            <p:cNvPr id="85" name="Oval 84">
+              <a:extLst>
+                <a:ext uri="{FF2B5EF4-FFF2-40B4-BE49-F238E27FC236}">
+                  <a16:creationId xmlns:a16="http://schemas.microsoft.com/office/drawing/2014/main" id="{4C564CFC-086C-2BB5-32D7-0DF89D4B1730}"/>
+                </a:ext>
+              </a:extLst>
+            </p:cNvPr>
+            <p:cNvSpPr/>
+            <p:nvPr/>
+          </p:nvSpPr>
+          <p:spPr>
+            <a:xfrm>
+              <a:off x="8643520" y="5542290"/>
+              <a:ext cx="112611" cy="121619"/>
+            </a:xfrm>
+            <a:prstGeom prst="ellipse">
+              <a:avLst/>
+            </a:prstGeom>
+            <a:solidFill>
+              <a:schemeClr val="bg1"/>
+            </a:solidFill>
+            <a:ln>
+              <a:solidFill>
+                <a:srgbClr val="7689A4"/>
+              </a:solidFill>
+            </a:ln>
+          </p:spPr>
+          <p:style>
+            <a:lnRef idx="2">
+              <a:schemeClr val="accent1">
+                <a:shade val="15000"/>
+              </a:schemeClr>
+            </a:lnRef>
+            <a:fillRef idx="1">
+              <a:schemeClr val="accent1"/>
+            </a:fillRef>
+            <a:effectRef idx="0">
+              <a:schemeClr val="accent1"/>
+            </a:effectRef>
+            <a:fontRef idx="minor">
+              <a:schemeClr val="lt1"/>
+            </a:fontRef>
+          </p:style>
+          <p:txBody>
+            <a:bodyPr rtlCol="0" anchor="ctr"/>
+            <a:lstStyle/>
+            <a:p>
+              <a:pPr algn="ctr"/>
+              <a:endParaRPr lang="en-GB" sz="2400"/>
+            </a:p>
+          </p:txBody>
+        </p:sp>
+        <p:sp>
+          <p:nvSpPr>
+            <p:cNvPr id="75" name="Oval 74">
+              <a:extLst>
+                <a:ext uri="{FF2B5EF4-FFF2-40B4-BE49-F238E27FC236}">
+                  <a16:creationId xmlns:a16="http://schemas.microsoft.com/office/drawing/2014/main" id="{3DF2F813-1A72-3370-BFE0-6DF6DBEE03F1}"/>
+                </a:ext>
+              </a:extLst>
+            </p:cNvPr>
+            <p:cNvSpPr/>
+            <p:nvPr/>
+          </p:nvSpPr>
+          <p:spPr>
+            <a:xfrm>
+              <a:off x="8643520" y="4860262"/>
+              <a:ext cx="112611" cy="121619"/>
+            </a:xfrm>
+            <a:prstGeom prst="ellipse">
+              <a:avLst/>
+            </a:prstGeom>
+            <a:solidFill>
+              <a:schemeClr val="bg1"/>
+            </a:solidFill>
+            <a:ln>
+              <a:solidFill>
+                <a:srgbClr val="7689A4"/>
+              </a:solidFill>
+            </a:ln>
+          </p:spPr>
+          <p:style>
+            <a:lnRef idx="2">
+              <a:schemeClr val="accent1">
+                <a:shade val="15000"/>
+              </a:schemeClr>
+            </a:lnRef>
+            <a:fillRef idx="1">
+              <a:schemeClr val="accent1"/>
+            </a:fillRef>
+            <a:effectRef idx="0">
+              <a:schemeClr val="accent1"/>
+            </a:effectRef>
+            <a:fontRef idx="minor">
+              <a:schemeClr val="lt1"/>
+            </a:fontRef>
+          </p:style>
+          <p:txBody>
+            <a:bodyPr rtlCol="0" anchor="ctr"/>
+            <a:lstStyle/>
+            <a:p>
+              <a:pPr algn="ctr"/>
+              <a:endParaRPr lang="en-GB" sz="2400"/>
+            </a:p>
+          </p:txBody>
+        </p:sp>
+        <p:sp>
+          <p:nvSpPr>
+            <p:cNvPr id="86" name="TextBox 85">
+              <a:extLst>
+                <a:ext uri="{FF2B5EF4-FFF2-40B4-BE49-F238E27FC236}">
+                  <a16:creationId xmlns:a16="http://schemas.microsoft.com/office/drawing/2014/main" id="{D389D251-6673-231F-E7E4-8AEEFABA14EE}"/>
+                </a:ext>
+              </a:extLst>
+            </p:cNvPr>
+            <p:cNvSpPr txBox="1"/>
+            <p:nvPr/>
+          </p:nvSpPr>
+          <p:spPr>
+            <a:xfrm>
+              <a:off x="4412339" y="3740181"/>
+              <a:ext cx="1372820" cy="282247"/>
+            </a:xfrm>
+            <a:prstGeom prst="rect">
+              <a:avLst/>
+            </a:prstGeom>
+            <a:noFill/>
+          </p:spPr>
+          <p:txBody>
+            <a:bodyPr wrap="square" rtlCol="0">
+              <a:spAutoFit/>
+            </a:bodyPr>
+            <a:lstStyle/>
+            <a:p>
+              <a:pPr algn="ctr"/>
+              <a:r>
+                <a:rPr lang="en-GB" sz="2400" b="1" dirty="0">
+                  <a:solidFill>
+                    <a:srgbClr val="CB8200"/>
+                  </a:solidFill>
+                </a:rPr>
+                <a:t>List</a:t>
+              </a:r>
+            </a:p>
+          </p:txBody>
+        </p:sp>
+        <p:sp>
+          <p:nvSpPr>
+            <p:cNvPr id="87" name="TextBox 86">
+              <a:extLst>
+                <a:ext uri="{FF2B5EF4-FFF2-40B4-BE49-F238E27FC236}">
+                  <a16:creationId xmlns:a16="http://schemas.microsoft.com/office/drawing/2014/main" id="{7BD7ECB5-3F28-559A-4CCD-8B010E9A3487}"/>
+                </a:ext>
+              </a:extLst>
+            </p:cNvPr>
+            <p:cNvSpPr txBox="1"/>
+            <p:nvPr/>
+          </p:nvSpPr>
+          <p:spPr>
+            <a:xfrm>
+              <a:off x="7167740" y="5336546"/>
+              <a:ext cx="1567706" cy="282247"/>
+            </a:xfrm>
+            <a:prstGeom prst="rect">
+              <a:avLst/>
+            </a:prstGeom>
+            <a:noFill/>
+          </p:spPr>
+          <p:txBody>
+            <a:bodyPr wrap="square" rtlCol="0">
+              <a:spAutoFit/>
+            </a:bodyPr>
+            <a:lstStyle/>
+            <a:p>
+              <a:pPr algn="ctr"/>
+              <a:r>
+                <a:rPr lang="en-GB" sz="2400" b="1" dirty="0">
+                  <a:solidFill>
+                    <a:srgbClr val="CB8200"/>
+                  </a:solidFill>
+                </a:rPr>
+                <a:t>List</a:t>
+              </a:r>
+            </a:p>
+          </p:txBody>
+        </p:sp>
+        <p:sp>
+          <p:nvSpPr>
+            <p:cNvPr id="88" name="TextBox 87">
+              <a:extLst>
+                <a:ext uri="{FF2B5EF4-FFF2-40B4-BE49-F238E27FC236}">
+                  <a16:creationId xmlns:a16="http://schemas.microsoft.com/office/drawing/2014/main" id="{7D64586F-18E8-71CE-DD16-A60B46F5BF1E}"/>
+                </a:ext>
+              </a:extLst>
+            </p:cNvPr>
+            <p:cNvSpPr txBox="1"/>
+            <p:nvPr/>
+          </p:nvSpPr>
+          <p:spPr>
+            <a:xfrm>
+              <a:off x="4412340" y="4635147"/>
+              <a:ext cx="4484937" cy="305301"/>
+            </a:xfrm>
+            <a:prstGeom prst="rect">
+              <a:avLst/>
+            </a:prstGeom>
+            <a:noFill/>
+          </p:spPr>
+          <p:txBody>
+            <a:bodyPr wrap="square" rtlCol="0">
+              <a:spAutoFit/>
+            </a:bodyPr>
+            <a:lstStyle/>
+            <a:p>
+              <a:r>
+                <a:rPr lang="en-GB" sz="2400" b="1" dirty="0">
+                  <a:solidFill>
+                    <a:schemeClr val="accent1"/>
+                  </a:solidFill>
+                </a:rPr>
+                <a:t>Dictionary</a:t>
+              </a:r>
+            </a:p>
+          </p:txBody>
+        </p:sp>
+      </p:grpSp>
+    </p:spTree>
+    <p:extLst>
+      <p:ext uri="{BB962C8B-B14F-4D97-AF65-F5344CB8AC3E}">
+        <p14:creationId xmlns:p14="http://schemas.microsoft.com/office/powerpoint/2010/main" val="730716461"/>
+      </p:ext>
+    </p:extLst>
+  </p:cSld>
+  <p:clrMapOvr>
+    <a:masterClrMapping/>
+  </p:clrMapOvr>
+</p:sld>
+</file>
+
 <file path=ppt/theme/theme1.xml><?xml version="1.0" encoding="utf-8"?>
 <a:theme xmlns:a="http://schemas.openxmlformats.org/drawingml/2006/main" name="Office Theme">
   <a:themeElements>

</xml_diff>